<commit_message>
update docs, design diagrams and images used
</commit_message>
<xml_diff>
--- a/images/backendPackageOverview.pptx
+++ b/images/backendPackageOverview.pptx
@@ -212,7 +212,7 @@
             <a:fld id="{5D8FA8FF-20DC-44E5-8C35-13EAF0A5698C}" type="datetimeFigureOut">
               <a:rPr lang="en-SG" smtClean="0"/>
               <a:pPr/>
-              <a:t>2/11/18</a:t>
+              <a:t>8/11/18</a:t>
             </a:fld>
             <a:endParaRPr lang="en-SG"/>
           </a:p>
@@ -751,7 +751,7 @@
             <a:fld id="{1D8BD707-D9CF-40AE-B4C6-C98DA3205C09}" type="datetimeFigureOut">
               <a:rPr lang="en-US" smtClean="0"/>
               <a:pPr/>
-              <a:t>11/2/18</a:t>
+              <a:t>11/8/18</a:t>
             </a:fld>
             <a:endParaRPr lang="en-US"/>
           </a:p>
@@ -916,7 +916,7 @@
             <a:fld id="{1D8BD707-D9CF-40AE-B4C6-C98DA3205C09}" type="datetimeFigureOut">
               <a:rPr lang="en-US" smtClean="0"/>
               <a:pPr/>
-              <a:t>11/2/18</a:t>
+              <a:t>11/8/18</a:t>
             </a:fld>
             <a:endParaRPr lang="en-US"/>
           </a:p>
@@ -1091,7 +1091,7 @@
             <a:fld id="{1D8BD707-D9CF-40AE-B4C6-C98DA3205C09}" type="datetimeFigureOut">
               <a:rPr lang="en-US" smtClean="0"/>
               <a:pPr/>
-              <a:t>11/2/18</a:t>
+              <a:t>11/8/18</a:t>
             </a:fld>
             <a:endParaRPr lang="en-US"/>
           </a:p>
@@ -1256,7 +1256,7 @@
             <a:fld id="{1D8BD707-D9CF-40AE-B4C6-C98DA3205C09}" type="datetimeFigureOut">
               <a:rPr lang="en-US" smtClean="0"/>
               <a:pPr/>
-              <a:t>11/2/18</a:t>
+              <a:t>11/8/18</a:t>
             </a:fld>
             <a:endParaRPr lang="en-US"/>
           </a:p>
@@ -1498,7 +1498,7 @@
             <a:fld id="{1D8BD707-D9CF-40AE-B4C6-C98DA3205C09}" type="datetimeFigureOut">
               <a:rPr lang="en-US" smtClean="0"/>
               <a:pPr/>
-              <a:t>11/2/18</a:t>
+              <a:t>11/8/18</a:t>
             </a:fld>
             <a:endParaRPr lang="en-US"/>
           </a:p>
@@ -1780,7 +1780,7 @@
             <a:fld id="{1D8BD707-D9CF-40AE-B4C6-C98DA3205C09}" type="datetimeFigureOut">
               <a:rPr lang="en-US" smtClean="0"/>
               <a:pPr/>
-              <a:t>11/2/18</a:t>
+              <a:t>11/8/18</a:t>
             </a:fld>
             <a:endParaRPr lang="en-US"/>
           </a:p>
@@ -2196,7 +2196,7 @@
             <a:fld id="{1D8BD707-D9CF-40AE-B4C6-C98DA3205C09}" type="datetimeFigureOut">
               <a:rPr lang="en-US" smtClean="0"/>
               <a:pPr/>
-              <a:t>11/2/18</a:t>
+              <a:t>11/8/18</a:t>
             </a:fld>
             <a:endParaRPr lang="en-US"/>
           </a:p>
@@ -2310,7 +2310,7 @@
             <a:fld id="{1D8BD707-D9CF-40AE-B4C6-C98DA3205C09}" type="datetimeFigureOut">
               <a:rPr lang="en-US" smtClean="0"/>
               <a:pPr/>
-              <a:t>11/2/18</a:t>
+              <a:t>11/8/18</a:t>
             </a:fld>
             <a:endParaRPr lang="en-US"/>
           </a:p>
@@ -2402,7 +2402,7 @@
             <a:fld id="{1D8BD707-D9CF-40AE-B4C6-C98DA3205C09}" type="datetimeFigureOut">
               <a:rPr lang="en-US" smtClean="0"/>
               <a:pPr/>
-              <a:t>11/2/18</a:t>
+              <a:t>11/8/18</a:t>
             </a:fld>
             <a:endParaRPr lang="en-US"/>
           </a:p>
@@ -2674,7 +2674,7 @@
             <a:fld id="{1D8BD707-D9CF-40AE-B4C6-C98DA3205C09}" type="datetimeFigureOut">
               <a:rPr lang="en-US" smtClean="0"/>
               <a:pPr/>
-              <a:t>11/2/18</a:t>
+              <a:t>11/8/18</a:t>
             </a:fld>
             <a:endParaRPr lang="en-US"/>
           </a:p>
@@ -2923,7 +2923,7 @@
             <a:fld id="{1D8BD707-D9CF-40AE-B4C6-C98DA3205C09}" type="datetimeFigureOut">
               <a:rPr lang="en-US" smtClean="0"/>
               <a:pPr/>
-              <a:t>11/2/18</a:t>
+              <a:t>11/8/18</a:t>
             </a:fld>
             <a:endParaRPr lang="en-US"/>
           </a:p>
@@ -3131,7 +3131,7 @@
             <a:fld id="{1D8BD707-D9CF-40AE-B4C6-C98DA3205C09}" type="datetimeFigureOut">
               <a:rPr lang="en-US" smtClean="0"/>
               <a:pPr/>
-              <a:t>11/2/18</a:t>
+              <a:t>11/8/18</a:t>
             </a:fld>
             <a:endParaRPr lang="en-US"/>
           </a:p>
@@ -3745,10 +3745,10 @@
         </p:nvGrpSpPr>
         <p:grpSpPr>
           <a:xfrm>
-            <a:off x="269087" y="3598146"/>
-            <a:ext cx="1620000" cy="540002"/>
-            <a:chOff x="-228600" y="1364151"/>
-            <a:chExt cx="1371600" cy="609602"/>
+            <a:off x="269087" y="3524794"/>
+            <a:ext cx="1620000" cy="539999"/>
+            <a:chOff x="-228600" y="1281348"/>
+            <a:chExt cx="1371600" cy="609600"/>
           </a:xfrm>
           <a:solidFill>
             <a:schemeClr val="bg1"/>
@@ -3762,7 +3762,7 @@
           </p:nvSpPr>
           <p:spPr>
             <a:xfrm>
-              <a:off x="-228600" y="1486072"/>
+              <a:off x="-228600" y="1403267"/>
               <a:ext cx="1371600" cy="487681"/>
             </a:xfrm>
             <a:prstGeom prst="rect">
@@ -3809,7 +3809,7 @@
                     </a:schemeClr>
                   </a:solidFill>
                 </a:rPr>
-                <a:t>::adviser</a:t>
+                <a:t>::advise</a:t>
               </a:r>
               <a:endParaRPr lang="en-SG" sz="1400" b="1" dirty="0">
                 <a:solidFill>
@@ -3829,7 +3829,7 @@
           </p:nvSpPr>
           <p:spPr>
             <a:xfrm>
-              <a:off x="685800" y="1364151"/>
+              <a:off x="685800" y="1281348"/>
               <a:ext cx="457200" cy="121920"/>
             </a:xfrm>
             <a:prstGeom prst="rect">
@@ -4068,17 +4068,7 @@
                     </a:schemeClr>
                   </a:solidFill>
                 </a:rPr>
-                <a:t>storage::</a:t>
-              </a:r>
-              <a:r>
-                <a:rPr lang="en-US" sz="1400" b="1" dirty="0" err="1">
-                  <a:solidFill>
-                    <a:schemeClr val="accent3">
-                      <a:lumMod val="75000"/>
-                    </a:schemeClr>
-                  </a:solidFill>
-                </a:rPr>
-                <a:t>api</a:t>
+                <a:t>storage::repository</a:t>
               </a:r>
               <a:r>
                 <a:rPr lang="en-SG" sz="1400" b="1" dirty="0">
@@ -4860,13 +4850,11 @@
         </p:nvCxnSpPr>
         <p:spPr>
           <a:xfrm>
-            <a:off x="2024802" y="3448101"/>
-            <a:ext cx="361086" cy="12700"/>
+            <a:off x="2014907" y="3431992"/>
+            <a:ext cx="370981" cy="0"/>
           </a:xfrm>
-          <a:prstGeom prst="bentConnector3">
-            <a:avLst>
-              <a:gd name="adj1" fmla="val 50000"/>
-            </a:avLst>
+          <a:prstGeom prst="straightConnector1">
+            <a:avLst/>
           </a:prstGeom>
           <a:ln w="38100">
             <a:solidFill>
@@ -4903,14 +4891,12 @@
           <p:nvPr/>
         </p:nvCxnSpPr>
         <p:spPr>
-          <a:xfrm flipV="1">
-            <a:off x="4205820" y="3463203"/>
-            <a:ext cx="467424" cy="12700"/>
+          <a:xfrm>
+            <a:off x="4205820" y="3475903"/>
+            <a:ext cx="436527" cy="0"/>
           </a:xfrm>
-          <a:prstGeom prst="bentConnector3">
-            <a:avLst>
-              <a:gd name="adj1" fmla="val 50000"/>
-            </a:avLst>
+          <a:prstGeom prst="straightConnector1">
+            <a:avLst/>
           </a:prstGeom>
           <a:ln w="38100">
             <a:solidFill>

</xml_diff>

<commit_message>
correct and add more design diagram
</commit_message>
<xml_diff>
--- a/images/backendPackageOverview.pptx
+++ b/images/backendPackageOverview.pptx
@@ -212,7 +212,7 @@
             <a:fld id="{5D8FA8FF-20DC-44E5-8C35-13EAF0A5698C}" type="datetimeFigureOut">
               <a:rPr lang="en-SG" smtClean="0"/>
               <a:pPr/>
-              <a:t>8/11/18</a:t>
+              <a:t>14/11/18</a:t>
             </a:fld>
             <a:endParaRPr lang="en-SG"/>
           </a:p>
@@ -751,7 +751,7 @@
             <a:fld id="{1D8BD707-D9CF-40AE-B4C6-C98DA3205C09}" type="datetimeFigureOut">
               <a:rPr lang="en-US" smtClean="0"/>
               <a:pPr/>
-              <a:t>11/8/18</a:t>
+              <a:t>11/14/18</a:t>
             </a:fld>
             <a:endParaRPr lang="en-US"/>
           </a:p>
@@ -916,7 +916,7 @@
             <a:fld id="{1D8BD707-D9CF-40AE-B4C6-C98DA3205C09}" type="datetimeFigureOut">
               <a:rPr lang="en-US" smtClean="0"/>
               <a:pPr/>
-              <a:t>11/8/18</a:t>
+              <a:t>11/14/18</a:t>
             </a:fld>
             <a:endParaRPr lang="en-US"/>
           </a:p>
@@ -1091,7 +1091,7 @@
             <a:fld id="{1D8BD707-D9CF-40AE-B4C6-C98DA3205C09}" type="datetimeFigureOut">
               <a:rPr lang="en-US" smtClean="0"/>
               <a:pPr/>
-              <a:t>11/8/18</a:t>
+              <a:t>11/14/18</a:t>
             </a:fld>
             <a:endParaRPr lang="en-US"/>
           </a:p>
@@ -1256,7 +1256,7 @@
             <a:fld id="{1D8BD707-D9CF-40AE-B4C6-C98DA3205C09}" type="datetimeFigureOut">
               <a:rPr lang="en-US" smtClean="0"/>
               <a:pPr/>
-              <a:t>11/8/18</a:t>
+              <a:t>11/14/18</a:t>
             </a:fld>
             <a:endParaRPr lang="en-US"/>
           </a:p>
@@ -1498,7 +1498,7 @@
             <a:fld id="{1D8BD707-D9CF-40AE-B4C6-C98DA3205C09}" type="datetimeFigureOut">
               <a:rPr lang="en-US" smtClean="0"/>
               <a:pPr/>
-              <a:t>11/8/18</a:t>
+              <a:t>11/14/18</a:t>
             </a:fld>
             <a:endParaRPr lang="en-US"/>
           </a:p>
@@ -1780,7 +1780,7 @@
             <a:fld id="{1D8BD707-D9CF-40AE-B4C6-C98DA3205C09}" type="datetimeFigureOut">
               <a:rPr lang="en-US" smtClean="0"/>
               <a:pPr/>
-              <a:t>11/8/18</a:t>
+              <a:t>11/14/18</a:t>
             </a:fld>
             <a:endParaRPr lang="en-US"/>
           </a:p>
@@ -2196,7 +2196,7 @@
             <a:fld id="{1D8BD707-D9CF-40AE-B4C6-C98DA3205C09}" type="datetimeFigureOut">
               <a:rPr lang="en-US" smtClean="0"/>
               <a:pPr/>
-              <a:t>11/8/18</a:t>
+              <a:t>11/14/18</a:t>
             </a:fld>
             <a:endParaRPr lang="en-US"/>
           </a:p>
@@ -2310,7 +2310,7 @@
             <a:fld id="{1D8BD707-D9CF-40AE-B4C6-C98DA3205C09}" type="datetimeFigureOut">
               <a:rPr lang="en-US" smtClean="0"/>
               <a:pPr/>
-              <a:t>11/8/18</a:t>
+              <a:t>11/14/18</a:t>
             </a:fld>
             <a:endParaRPr lang="en-US"/>
           </a:p>
@@ -2402,7 +2402,7 @@
             <a:fld id="{1D8BD707-D9CF-40AE-B4C6-C98DA3205C09}" type="datetimeFigureOut">
               <a:rPr lang="en-US" smtClean="0"/>
               <a:pPr/>
-              <a:t>11/8/18</a:t>
+              <a:t>11/14/18</a:t>
             </a:fld>
             <a:endParaRPr lang="en-US"/>
           </a:p>
@@ -2674,7 +2674,7 @@
             <a:fld id="{1D8BD707-D9CF-40AE-B4C6-C98DA3205C09}" type="datetimeFigureOut">
               <a:rPr lang="en-US" smtClean="0"/>
               <a:pPr/>
-              <a:t>11/8/18</a:t>
+              <a:t>11/14/18</a:t>
             </a:fld>
             <a:endParaRPr lang="en-US"/>
           </a:p>
@@ -2923,7 +2923,7 @@
             <a:fld id="{1D8BD707-D9CF-40AE-B4C6-C98DA3205C09}" type="datetimeFigureOut">
               <a:rPr lang="en-US" smtClean="0"/>
               <a:pPr/>
-              <a:t>11/8/18</a:t>
+              <a:t>11/14/18</a:t>
             </a:fld>
             <a:endParaRPr lang="en-US"/>
           </a:p>
@@ -3131,7 +3131,7 @@
             <a:fld id="{1D8BD707-D9CF-40AE-B4C6-C98DA3205C09}" type="datetimeFigureOut">
               <a:rPr lang="en-US" smtClean="0"/>
               <a:pPr/>
-              <a:t>11/8/18</a:t>
+              <a:t>11/14/18</a:t>
             </a:fld>
             <a:endParaRPr lang="en-US"/>
           </a:p>
@@ -3869,136 +3869,76 @@
           </p:txBody>
         </p:sp>
       </p:grpSp>
-      <p:grpSp>
-        <p:nvGrpSpPr>
-          <p:cNvPr id="97" name="Group 96"/>
-          <p:cNvGrpSpPr/>
+      <p:sp>
+        <p:nvSpPr>
+          <p:cNvPr id="98" name="Rectangle 97"/>
+          <p:cNvSpPr/>
           <p:nvPr/>
-        </p:nvGrpSpPr>
-        <p:grpSpPr>
+        </p:nvSpPr>
+        <p:spPr>
           <a:xfrm>
-            <a:off x="2511888" y="2831695"/>
-            <a:ext cx="1620000" cy="540000"/>
-            <a:chOff x="-278892" y="1371600"/>
-            <a:chExt cx="1371600" cy="762000"/>
+            <a:off x="2511888" y="2939695"/>
+            <a:ext cx="1620000" cy="432000"/>
           </a:xfrm>
+          <a:prstGeom prst="rect">
+            <a:avLst/>
+          </a:prstGeom>
           <a:solidFill>
             <a:schemeClr val="bg1"/>
           </a:solidFill>
-        </p:grpSpPr>
-        <p:sp>
-          <p:nvSpPr>
-            <p:cNvPr id="98" name="Rectangle 97"/>
-            <p:cNvSpPr/>
-            <p:nvPr/>
-          </p:nvSpPr>
-          <p:spPr>
-            <a:xfrm>
-              <a:off x="-278892" y="1524000"/>
-              <a:ext cx="1371600" cy="609600"/>
-            </a:xfrm>
-            <a:prstGeom prst="rect">
-              <a:avLst/>
-            </a:prstGeom>
-            <a:grpFill/>
-            <a:ln>
-              <a:solidFill>
-                <a:schemeClr val="accent4">
-                  <a:lumMod val="75000"/>
-                </a:schemeClr>
-              </a:solidFill>
-            </a:ln>
-          </p:spPr>
-          <p:style>
-            <a:lnRef idx="2">
-              <a:schemeClr val="accent1">
-                <a:shade val="50000"/>
+          <a:ln>
+            <a:solidFill>
+              <a:schemeClr val="accent4">
+                <a:lumMod val="75000"/>
               </a:schemeClr>
-            </a:lnRef>
-            <a:fillRef idx="1">
-              <a:schemeClr val="accent1"/>
-            </a:fillRef>
-            <a:effectRef idx="0">
-              <a:schemeClr val="accent1"/>
-            </a:effectRef>
-            <a:fontRef idx="minor">
-              <a:schemeClr val="lt1"/>
-            </a:fontRef>
-          </p:style>
-          <p:txBody>
-            <a:bodyPr rtlCol="0" anchor="ctr"/>
-            <a:lstStyle/>
-            <a:p>
-              <a:pPr algn="ctr"/>
-              <a:r>
-                <a:rPr lang="en-US" sz="1400" b="1" dirty="0">
-                  <a:solidFill>
-                    <a:srgbClr val="7030A0"/>
-                  </a:solidFill>
-                </a:rPr>
-                <a:t>logic::data</a:t>
-              </a:r>
-              <a:endParaRPr lang="en-SG" sz="1400" b="1" dirty="0">
+            </a:solidFill>
+          </a:ln>
+        </p:spPr>
+        <p:style>
+          <a:lnRef idx="2">
+            <a:schemeClr val="accent1">
+              <a:shade val="50000"/>
+            </a:schemeClr>
+          </a:lnRef>
+          <a:fillRef idx="1">
+            <a:schemeClr val="accent1"/>
+          </a:fillRef>
+          <a:effectRef idx="0">
+            <a:schemeClr val="accent1"/>
+          </a:effectRef>
+          <a:fontRef idx="minor">
+            <a:schemeClr val="lt1"/>
+          </a:fontRef>
+        </p:style>
+        <p:txBody>
+          <a:bodyPr rtlCol="0" anchor="ctr"/>
+          <a:lstStyle/>
+          <a:p>
+            <a:pPr algn="ctr"/>
+            <a:r>
+              <a:rPr lang="en-SG" sz="1400" b="1" dirty="0" smtClean="0">
                 <a:solidFill>
                   <a:srgbClr val="7030A0"/>
                 </a:solidFill>
-              </a:endParaRPr>
-            </a:p>
-          </p:txBody>
-        </p:sp>
-        <p:sp>
-          <p:nvSpPr>
-            <p:cNvPr id="99" name="Rectangle 98"/>
-            <p:cNvSpPr/>
-            <p:nvPr/>
-          </p:nvSpPr>
-          <p:spPr>
-            <a:xfrm>
-              <a:off x="635508" y="1371600"/>
-              <a:ext cx="457200" cy="152400"/>
-            </a:xfrm>
-            <a:prstGeom prst="rect">
-              <a:avLst/>
-            </a:prstGeom>
-            <a:grpFill/>
-            <a:ln>
-              <a:solidFill>
-                <a:schemeClr val="accent4">
-                  <a:lumMod val="75000"/>
-                </a:schemeClr>
-              </a:solidFill>
-            </a:ln>
-          </p:spPr>
-          <p:style>
-            <a:lnRef idx="2">
-              <a:schemeClr val="accent1">
-                <a:shade val="50000"/>
-              </a:schemeClr>
-            </a:lnRef>
-            <a:fillRef idx="1">
-              <a:schemeClr val="accent1"/>
-            </a:fillRef>
-            <a:effectRef idx="0">
-              <a:schemeClr val="accent1"/>
-            </a:effectRef>
-            <a:fontRef idx="minor">
-              <a:schemeClr val="lt1"/>
-            </a:fontRef>
-          </p:style>
-          <p:txBody>
-            <a:bodyPr rtlCol="0" anchor="ctr"/>
-            <a:lstStyle/>
-            <a:p>
-              <a:pPr algn="ctr"/>
-              <a:endParaRPr lang="en-SG" sz="1400" b="1">
+              </a:rPr>
+              <a:t>*</a:t>
+            </a:r>
+            <a:r>
+              <a:rPr lang="en-SG" sz="1400" b="1" dirty="0" err="1" smtClean="0">
                 <a:solidFill>
                   <a:srgbClr val="7030A0"/>
                 </a:solidFill>
-              </a:endParaRPr>
-            </a:p>
-          </p:txBody>
-        </p:sp>
-      </p:grpSp>
+              </a:rPr>
+              <a:t>Logic.java</a:t>
+            </a:r>
+            <a:endParaRPr lang="en-SG" sz="1400" b="1" dirty="0">
+              <a:solidFill>
+                <a:srgbClr val="7030A0"/>
+              </a:solidFill>
+            </a:endParaRPr>
+          </a:p>
+        </p:txBody>
+      </p:sp>
       <p:grpSp>
         <p:nvGrpSpPr>
           <p:cNvPr id="103" name="Group 102"/>
@@ -4572,7 +4512,7 @@
         <p:grpSpPr>
           <a:xfrm>
             <a:off x="4300460" y="1460631"/>
-            <a:ext cx="1835999" cy="487699"/>
+            <a:ext cx="2084454" cy="487699"/>
             <a:chOff x="-762000" y="1396159"/>
             <a:chExt cx="1905000" cy="481133"/>
           </a:xfrm>
@@ -5042,7 +4982,7 @@
           <p:cNvPr id="117" name="Group 116">
             <a:extLst>
               <a:ext uri="{FF2B5EF4-FFF2-40B4-BE49-F238E27FC236}">
-                <a16:creationId xmlns:a16="http://schemas.microsoft.com/office/drawing/2014/main" id="{4FDC26D5-F4B7-8849-9F45-00A27180D155}"/>
+                <a16:creationId xmlns:a16="http://schemas.microsoft.com/office/drawing/2014/main" xmlns="" id="{4FDC26D5-F4B7-8849-9F45-00A27180D155}"/>
               </a:ext>
             </a:extLst>
           </p:cNvPr>
@@ -5067,7 +5007,7 @@
             <p:cNvPr id="129" name="Rectangle 128">
               <a:extLst>
                 <a:ext uri="{FF2B5EF4-FFF2-40B4-BE49-F238E27FC236}">
-                  <a16:creationId xmlns:a16="http://schemas.microsoft.com/office/drawing/2014/main" id="{0907A73C-A84B-624B-9EFB-54EDEEC5FACF}"/>
+                  <a16:creationId xmlns:a16="http://schemas.microsoft.com/office/drawing/2014/main" xmlns="" id="{0907A73C-A84B-624B-9EFB-54EDEEC5FACF}"/>
                 </a:ext>
               </a:extLst>
             </p:cNvPr>
@@ -5137,7 +5077,7 @@
             <p:cNvPr id="130" name="Rectangle 129">
               <a:extLst>
                 <a:ext uri="{FF2B5EF4-FFF2-40B4-BE49-F238E27FC236}">
-                  <a16:creationId xmlns:a16="http://schemas.microsoft.com/office/drawing/2014/main" id="{01BE302F-0E22-EF4F-A558-F1CCDBA2A16B}"/>
+                  <a16:creationId xmlns:a16="http://schemas.microsoft.com/office/drawing/2014/main" xmlns="" id="{01BE302F-0E22-EF4F-A558-F1CCDBA2A16B}"/>
                 </a:ext>
               </a:extLst>
             </p:cNvPr>

</xml_diff>